<commit_message>
Added some stuff to nupack event
</commit_message>
<xml_diff>
--- a/events/20101029_nupack/Package Management.pptx
+++ b/events/20101029_nupack/Package Management.pptx
@@ -9,6 +9,10 @@
     <p:sldId id="257" r:id="rId3"/>
     <p:sldId id="258" r:id="rId4"/>
     <p:sldId id="260" r:id="rId5"/>
+    <p:sldId id="261" r:id="rId6"/>
+    <p:sldId id="263" r:id="rId7"/>
+    <p:sldId id="264" r:id="rId8"/>
+    <p:sldId id="262" r:id="rId9"/>
   </p:sldIdLst>
   <p:sldSz cx="9144000" cy="6858000" type="screen4x3"/>
   <p:notesSz cx="6858000" cy="9144000"/>
@@ -3128,19 +3132,51 @@
       </p:sp>
       <p:sp>
         <p:nvSpPr>
-          <p:cNvPr id="3" name="Subtitle 2"/>
-          <p:cNvSpPr>
-            <a:spLocks noGrp="1"/>
-          </p:cNvSpPr>
-          <p:nvPr>
-            <p:ph type="subTitle" idx="1"/>
-          </p:nvPr>
-        </p:nvSpPr>
-        <p:spPr/>
-        <p:txBody>
-          <a:bodyPr/>
-          <a:lstStyle/>
-          <a:p>
+          <p:cNvPr id="4" name="TextBox 3"/>
+          <p:cNvSpPr txBox="1"/>
+          <p:nvPr/>
+        </p:nvSpPr>
+        <p:spPr>
+          <a:xfrm>
+            <a:off x="1619672" y="5733256"/>
+            <a:ext cx="5400600" cy="369332"/>
+          </a:xfrm>
+          <a:prstGeom prst="rect">
+            <a:avLst/>
+          </a:prstGeom>
+          <a:noFill/>
+        </p:spPr>
+        <p:txBody>
+          <a:bodyPr wrap="square" rtlCol="0">
+            <a:spAutoFit/>
+          </a:bodyPr>
+          <a:lstStyle/>
+          <a:p>
+            <a:pPr algn="ctr"/>
+            <a:r>
+              <a:rPr lang="en-US" dirty="0" smtClean="0"/>
+              <a:t>Mike </a:t>
+            </a:r>
+            <a:r>
+              <a:rPr lang="en-US" dirty="0" err="1" smtClean="0"/>
+              <a:t>Chaliy</a:t>
+            </a:r>
+            <a:r>
+              <a:rPr lang="en-US" dirty="0"/>
+              <a:t>, Igor </a:t>
+            </a:r>
+            <a:r>
+              <a:rPr lang="en-US" dirty="0" err="1" smtClean="0"/>
+              <a:t>Tamaschuk</a:t>
+            </a:r>
+            <a:r>
+              <a:rPr lang="en-US" dirty="0"/>
+              <a:t> </a:t>
+            </a:r>
+            <a:r>
+              <a:rPr lang="en-US" dirty="0" smtClean="0"/>
+              <a:t>© 2010</a:t>
+            </a:r>
             <a:endParaRPr lang="en-US" dirty="0"/>
           </a:p>
         </p:txBody>
@@ -3434,11 +3470,7 @@
             <a:pPr algn="ctr"/>
             <a:r>
               <a:rPr lang="en-US" sz="13800" dirty="0" smtClean="0"/>
-              <a:t>nap</a:t>
-            </a:r>
-            <a:r>
-              <a:rPr lang="en-US" sz="13800" dirty="0" smtClean="0"/>
-              <a:t> </a:t>
+              <a:t>nap </a:t>
             </a:r>
             <a:r>
               <a:rPr lang="en-US" sz="13800" dirty="0" err="1" smtClean="0"/>
@@ -3452,6 +3484,492 @@
     <p:extLst>
       <p:ext uri="{BB962C8B-B14F-4D97-AF65-F5344CB8AC3E}">
         <p14:creationId xmlns:p14="http://schemas.microsoft.com/office/powerpoint/2010/main" val="2570157948"/>
+      </p:ext>
+    </p:extLst>
+  </p:cSld>
+  <p:clrMapOvr>
+    <a:masterClrMapping/>
+  </p:clrMapOvr>
+</p:sld>
+</file>
+
+<file path=ppt/slides/slide5.xml><?xml version="1.0" encoding="utf-8"?>
+<p:sld xmlns:a="http://schemas.openxmlformats.org/drawingml/2006/main" xmlns:r="http://schemas.openxmlformats.org/officeDocument/2006/relationships" xmlns:p="http://schemas.openxmlformats.org/presentationml/2006/main">
+  <p:cSld>
+    <p:spTree>
+      <p:nvGrpSpPr>
+        <p:cNvPr id="1" name=""/>
+        <p:cNvGrpSpPr/>
+        <p:nvPr/>
+      </p:nvGrpSpPr>
+      <p:grpSpPr>
+        <a:xfrm>
+          <a:off x="0" y="0"/>
+          <a:ext cx="0" cy="0"/>
+          <a:chOff x="0" y="0"/>
+          <a:chExt cx="0" cy="0"/>
+        </a:xfrm>
+      </p:grpSpPr>
+      <p:sp>
+        <p:nvSpPr>
+          <p:cNvPr id="2" name="Title 1"/>
+          <p:cNvSpPr>
+            <a:spLocks noGrp="1"/>
+          </p:cNvSpPr>
+          <p:nvPr>
+            <p:ph type="title"/>
+          </p:nvPr>
+        </p:nvSpPr>
+        <p:spPr/>
+        <p:txBody>
+          <a:bodyPr/>
+          <a:lstStyle/>
+          <a:p>
+            <a:r>
+              <a:rPr lang="uk-UA" dirty="0" smtClean="0"/>
+              <a:t>Фишки</a:t>
+            </a:r>
+            <a:endParaRPr lang="en-US" dirty="0"/>
+          </a:p>
+        </p:txBody>
+      </p:sp>
+      <p:sp>
+        <p:nvSpPr>
+          <p:cNvPr id="3" name="Content Placeholder 2"/>
+          <p:cNvSpPr>
+            <a:spLocks noGrp="1"/>
+          </p:cNvSpPr>
+          <p:nvPr>
+            <p:ph idx="1"/>
+          </p:nvPr>
+        </p:nvSpPr>
+        <p:spPr/>
+        <p:txBody>
+          <a:bodyPr/>
+          <a:lstStyle/>
+          <a:p>
+            <a:r>
+              <a:rPr lang="uk-UA" dirty="0" smtClean="0"/>
+              <a:t>Центральн</a:t>
+            </a:r>
+            <a:r>
+              <a:rPr lang="ru-RU" dirty="0" smtClean="0"/>
+              <a:t>ый репозитарий</a:t>
+            </a:r>
+          </a:p>
+          <a:p>
+            <a:r>
+              <a:rPr lang="ru-RU" dirty="0" smtClean="0"/>
+              <a:t>Версионирование бибилотек</a:t>
+            </a:r>
+          </a:p>
+          <a:p>
+            <a:r>
+              <a:rPr lang="ru-RU" dirty="0" smtClean="0"/>
+              <a:t>Поддержка исходного кода</a:t>
+            </a:r>
+          </a:p>
+          <a:p>
+            <a:r>
+              <a:rPr lang="ru-RU" dirty="0" smtClean="0"/>
+              <a:t>Исполняемые пакеты</a:t>
+            </a:r>
+          </a:p>
+          <a:p>
+            <a:r>
+              <a:rPr lang="ru-RU" dirty="0" smtClean="0"/>
+              <a:t>Локальные репозитарии</a:t>
+            </a:r>
+          </a:p>
+          <a:p>
+            <a:r>
+              <a:rPr lang="ru-RU" dirty="0" smtClean="0"/>
+              <a:t>Жизнь на билд сервере</a:t>
+            </a:r>
+            <a:endParaRPr lang="en-US" dirty="0"/>
+          </a:p>
+        </p:txBody>
+      </p:sp>
+    </p:spTree>
+    <p:extLst>
+      <p:ext uri="{BB962C8B-B14F-4D97-AF65-F5344CB8AC3E}">
+        <p14:creationId xmlns:p14="http://schemas.microsoft.com/office/powerpoint/2010/main" val="2169914674"/>
+      </p:ext>
+    </p:extLst>
+  </p:cSld>
+  <p:clrMapOvr>
+    <a:masterClrMapping/>
+  </p:clrMapOvr>
+</p:sld>
+</file>
+
+<file path=ppt/slides/slide6.xml><?xml version="1.0" encoding="utf-8"?>
+<p:sld xmlns:a="http://schemas.openxmlformats.org/drawingml/2006/main" xmlns:r="http://schemas.openxmlformats.org/officeDocument/2006/relationships" xmlns:p="http://schemas.openxmlformats.org/presentationml/2006/main">
+  <p:cSld>
+    <p:spTree>
+      <p:nvGrpSpPr>
+        <p:cNvPr id="1" name=""/>
+        <p:cNvGrpSpPr/>
+        <p:nvPr/>
+      </p:nvGrpSpPr>
+      <p:grpSpPr>
+        <a:xfrm>
+          <a:off x="0" y="0"/>
+          <a:ext cx="0" cy="0"/>
+          <a:chOff x="0" y="0"/>
+          <a:chExt cx="0" cy="0"/>
+        </a:xfrm>
+      </p:grpSpPr>
+      <p:sp>
+        <p:nvSpPr>
+          <p:cNvPr id="2" name="Title 1"/>
+          <p:cNvSpPr>
+            <a:spLocks noGrp="1"/>
+          </p:cNvSpPr>
+          <p:nvPr>
+            <p:ph type="title"/>
+          </p:nvPr>
+        </p:nvSpPr>
+        <p:spPr/>
+        <p:txBody>
+          <a:bodyPr/>
+          <a:lstStyle/>
+          <a:p>
+            <a:r>
+              <a:rPr lang="ru-RU" dirty="0" smtClean="0"/>
+              <a:t>Внутри</a:t>
+            </a:r>
+            <a:r>
+              <a:rPr lang="en-US" dirty="0" smtClean="0"/>
+              <a:t> </a:t>
+            </a:r>
+            <a:r>
+              <a:rPr lang="en-US" dirty="0" err="1" smtClean="0"/>
+              <a:t>NuPack</a:t>
+            </a:r>
+            <a:endParaRPr lang="en-US" dirty="0"/>
+          </a:p>
+        </p:txBody>
+      </p:sp>
+      <p:sp>
+        <p:nvSpPr>
+          <p:cNvPr id="3" name="Content Placeholder 2"/>
+          <p:cNvSpPr>
+            <a:spLocks noGrp="1"/>
+          </p:cNvSpPr>
+          <p:nvPr>
+            <p:ph idx="1"/>
+          </p:nvPr>
+        </p:nvSpPr>
+        <p:spPr/>
+        <p:txBody>
+          <a:bodyPr/>
+          <a:lstStyle/>
+          <a:p>
+            <a:r>
+              <a:rPr lang="en-US" dirty="0" err="1" smtClean="0"/>
+              <a:t>O</a:t>
+            </a:r>
+            <a:r>
+              <a:rPr lang="en-US" dirty="0" err="1"/>
+              <a:t>D</a:t>
+            </a:r>
+            <a:r>
+              <a:rPr lang="en-US" dirty="0" err="1" smtClean="0"/>
+              <a:t>ata</a:t>
+            </a:r>
+            <a:r>
+              <a:rPr lang="en-US" dirty="0" smtClean="0"/>
+              <a:t>/</a:t>
+            </a:r>
+            <a:r>
+              <a:rPr lang="en-US" dirty="0" err="1" smtClean="0"/>
+              <a:t>AtomPub</a:t>
+            </a:r>
+            <a:r>
+              <a:rPr lang="en-US" dirty="0" smtClean="0"/>
+              <a:t> </a:t>
+            </a:r>
+            <a:r>
+              <a:rPr lang="uk-UA" dirty="0" smtClean="0"/>
+              <a:t>фид</a:t>
+            </a:r>
+            <a:endParaRPr lang="en-US" dirty="0" smtClean="0"/>
+          </a:p>
+          <a:p>
+            <a:r>
+              <a:rPr lang="en-US" dirty="0"/>
+              <a:t>Open Packaging </a:t>
+            </a:r>
+            <a:r>
+              <a:rPr lang="en-US" dirty="0" smtClean="0"/>
+              <a:t>Conventions</a:t>
+            </a:r>
+          </a:p>
+          <a:p>
+            <a:r>
+              <a:rPr lang="en-US" dirty="0" smtClean="0"/>
+              <a:t>PowerShell</a:t>
+            </a:r>
+            <a:endParaRPr lang="en-US" dirty="0"/>
+          </a:p>
+        </p:txBody>
+      </p:sp>
+    </p:spTree>
+    <p:extLst>
+      <p:ext uri="{BB962C8B-B14F-4D97-AF65-F5344CB8AC3E}">
+        <p14:creationId xmlns:p14="http://schemas.microsoft.com/office/powerpoint/2010/main" val="559040527"/>
+      </p:ext>
+    </p:extLst>
+  </p:cSld>
+  <p:clrMapOvr>
+    <a:masterClrMapping/>
+  </p:clrMapOvr>
+</p:sld>
+</file>
+
+<file path=ppt/slides/slide7.xml><?xml version="1.0" encoding="utf-8"?>
+<p:sld xmlns:a="http://schemas.openxmlformats.org/drawingml/2006/main" xmlns:r="http://schemas.openxmlformats.org/officeDocument/2006/relationships" xmlns:p="http://schemas.openxmlformats.org/presentationml/2006/main">
+  <p:cSld>
+    <p:spTree>
+      <p:nvGrpSpPr>
+        <p:cNvPr id="1" name=""/>
+        <p:cNvGrpSpPr/>
+        <p:nvPr/>
+      </p:nvGrpSpPr>
+      <p:grpSpPr>
+        <a:xfrm>
+          <a:off x="0" y="0"/>
+          <a:ext cx="0" cy="0"/>
+          <a:chOff x="0" y="0"/>
+          <a:chExt cx="0" cy="0"/>
+        </a:xfrm>
+      </p:grpSpPr>
+      <p:sp>
+        <p:nvSpPr>
+          <p:cNvPr id="2" name="Title 1"/>
+          <p:cNvSpPr>
+            <a:spLocks noGrp="1"/>
+          </p:cNvSpPr>
+          <p:nvPr>
+            <p:ph type="title"/>
+          </p:nvPr>
+        </p:nvSpPr>
+        <p:spPr/>
+        <p:txBody>
+          <a:bodyPr/>
+          <a:lstStyle/>
+          <a:p>
+            <a:r>
+              <a:rPr lang="uk-UA" dirty="0" smtClean="0"/>
+              <a:t>Проблем</a:t>
+            </a:r>
+            <a:r>
+              <a:rPr lang="ru-RU" dirty="0" smtClean="0"/>
+              <a:t>ы с </a:t>
+            </a:r>
+            <a:r>
+              <a:rPr lang="en-US" dirty="0" err="1" smtClean="0"/>
+              <a:t>NuPack</a:t>
+            </a:r>
+            <a:endParaRPr lang="en-US" dirty="0"/>
+          </a:p>
+        </p:txBody>
+      </p:sp>
+      <p:sp>
+        <p:nvSpPr>
+          <p:cNvPr id="3" name="Content Placeholder 2"/>
+          <p:cNvSpPr>
+            <a:spLocks noGrp="1"/>
+          </p:cNvSpPr>
+          <p:nvPr>
+            <p:ph idx="1"/>
+          </p:nvPr>
+        </p:nvSpPr>
+        <p:spPr/>
+        <p:txBody>
+          <a:bodyPr/>
+          <a:lstStyle/>
+          <a:p>
+            <a:endParaRPr lang="en-US" dirty="0"/>
+          </a:p>
+        </p:txBody>
+      </p:sp>
+      <p:pic>
+        <p:nvPicPr>
+          <p:cNvPr id="1027" name="Picture 3" descr="C:\Users\M\AppData\Local\Microsoft\Windows\Temporary Internet Files\Content.IE5\VBHQBCDP\MC900304323[1].wmf"/>
+          <p:cNvPicPr>
+            <a:picLocks noChangeAspect="1" noChangeArrowheads="1"/>
+          </p:cNvPicPr>
+          <p:nvPr/>
+        </p:nvPicPr>
+        <p:blipFill>
+          <a:blip r:embed="rId2" cstate="print">
+            <a:extLst>
+              <a:ext uri="{28A0092B-C50C-407E-A947-70E740481C1C}">
+                <a14:useLocalDpi xmlns:a14="http://schemas.microsoft.com/office/drawing/2010/main" val="0"/>
+              </a:ext>
+            </a:extLst>
+          </a:blip>
+          <a:srcRect/>
+          <a:stretch>
+            <a:fillRect/>
+          </a:stretch>
+        </p:blipFill>
+        <p:spPr bwMode="auto">
+          <a:xfrm>
+            <a:off x="3563888" y="3284984"/>
+            <a:ext cx="1824037" cy="749300"/>
+          </a:xfrm>
+          <a:prstGeom prst="rect">
+            <a:avLst/>
+          </a:prstGeom>
+          <a:noFill/>
+          <a:extLst>
+            <a:ext uri="{909E8E84-426E-40DD-AFC4-6F175D3DCCD1}">
+              <a14:hiddenFill xmlns:a14="http://schemas.microsoft.com/office/drawing/2010/main">
+                <a:solidFill>
+                  <a:srgbClr xmlns:mc="http://schemas.openxmlformats.org/markup-compatibility/2006" val="FFFFFF" mc:Ignorable=""/>
+                </a:solidFill>
+              </a14:hiddenFill>
+            </a:ext>
+          </a:extLst>
+        </p:spPr>
+      </p:pic>
+    </p:spTree>
+    <p:extLst>
+      <p:ext uri="{BB962C8B-B14F-4D97-AF65-F5344CB8AC3E}">
+        <p14:creationId xmlns:p14="http://schemas.microsoft.com/office/powerpoint/2010/main" val="4012109605"/>
+      </p:ext>
+    </p:extLst>
+  </p:cSld>
+  <p:clrMapOvr>
+    <a:masterClrMapping/>
+  </p:clrMapOvr>
+</p:sld>
+</file>
+
+<file path=ppt/slides/slide8.xml><?xml version="1.0" encoding="utf-8"?>
+<p:sld xmlns:a="http://schemas.openxmlformats.org/drawingml/2006/main" xmlns:r="http://schemas.openxmlformats.org/officeDocument/2006/relationships" xmlns:p="http://schemas.openxmlformats.org/presentationml/2006/main">
+  <p:cSld>
+    <p:spTree>
+      <p:nvGrpSpPr>
+        <p:cNvPr id="1" name=""/>
+        <p:cNvGrpSpPr/>
+        <p:nvPr/>
+      </p:nvGrpSpPr>
+      <p:grpSpPr>
+        <a:xfrm>
+          <a:off x="0" y="0"/>
+          <a:ext cx="0" cy="0"/>
+          <a:chOff x="0" y="0"/>
+          <a:chExt cx="0" cy="0"/>
+        </a:xfrm>
+      </p:grpSpPr>
+      <p:sp>
+        <p:nvSpPr>
+          <p:cNvPr id="2" name="Title 1"/>
+          <p:cNvSpPr>
+            <a:spLocks noGrp="1"/>
+          </p:cNvSpPr>
+          <p:nvPr>
+            <p:ph type="title"/>
+          </p:nvPr>
+        </p:nvSpPr>
+        <p:spPr/>
+        <p:txBody>
+          <a:bodyPr/>
+          <a:lstStyle/>
+          <a:p>
+            <a:r>
+              <a:rPr lang="uk-UA" dirty="0" smtClean="0"/>
+              <a:t>Сс</a:t>
+            </a:r>
+            <a:r>
+              <a:rPr lang="ru-RU" dirty="0" smtClean="0"/>
+              <a:t>ылки</a:t>
+            </a:r>
+            <a:endParaRPr lang="en-US" dirty="0"/>
+          </a:p>
+        </p:txBody>
+      </p:sp>
+      <p:sp>
+        <p:nvSpPr>
+          <p:cNvPr id="3" name="Content Placeholder 2"/>
+          <p:cNvSpPr>
+            <a:spLocks noGrp="1"/>
+          </p:cNvSpPr>
+          <p:nvPr>
+            <p:ph idx="1"/>
+          </p:nvPr>
+        </p:nvSpPr>
+        <p:spPr/>
+        <p:txBody>
+          <a:bodyPr/>
+          <a:lstStyle/>
+          <a:p>
+            <a:r>
+              <a:rPr lang="en-US" dirty="0" smtClean="0">
+                <a:hlinkClick r:id="rId2"/>
+              </a:rPr>
+              <a:t>http://nupack.codeplex.com</a:t>
+            </a:r>
+            <a:r>
+              <a:rPr lang="en-US" dirty="0" smtClean="0"/>
+              <a:t> </a:t>
+            </a:r>
+            <a:r>
+              <a:rPr lang="uk-UA" dirty="0" smtClean="0"/>
+              <a:t>(для тех кто игнорирует Гугль)</a:t>
+            </a:r>
+          </a:p>
+          <a:p>
+            <a:r>
+              <a:rPr lang="en-US" dirty="0">
+                <a:hlinkClick r:id="rId3"/>
+              </a:rPr>
+              <a:t>http://</a:t>
+            </a:r>
+            <a:r>
+              <a:rPr lang="en-US" dirty="0" smtClean="0">
+                <a:hlinkClick r:id="rId3"/>
+              </a:rPr>
+              <a:t>haacked.com/archive/2010/10/06/introducing-nupack-package-manager.aspx</a:t>
+            </a:r>
+            <a:r>
+              <a:rPr lang="uk-UA" dirty="0" smtClean="0"/>
+              <a:t> интересно почитать изначальн</a:t>
+            </a:r>
+            <a:r>
+              <a:rPr lang="ru-RU" dirty="0" smtClean="0"/>
+              <a:t>ые цели</a:t>
+            </a:r>
+          </a:p>
+          <a:p>
+            <a:r>
+              <a:rPr lang="en-US" dirty="0">
+                <a:hlinkClick r:id="rId4"/>
+              </a:rPr>
+              <a:t>http://</a:t>
+            </a:r>
+            <a:r>
+              <a:rPr lang="en-US" dirty="0" smtClean="0">
+                <a:hlinkClick r:id="rId4"/>
+              </a:rPr>
+              <a:t>www.bing.com/search?q=nupack+package+manager</a:t>
+            </a:r>
+            <a:r>
+              <a:rPr lang="ru-RU" dirty="0" smtClean="0"/>
+              <a:t> (пока что лучший истоник нетропии)</a:t>
+            </a:r>
+            <a:endParaRPr lang="en-US" dirty="0"/>
+          </a:p>
+        </p:txBody>
+      </p:sp>
+    </p:spTree>
+    <p:extLst>
+      <p:ext uri="{BB962C8B-B14F-4D97-AF65-F5344CB8AC3E}">
+        <p14:creationId xmlns:p14="http://schemas.microsoft.com/office/powerpoint/2010/main" val="3160712476"/>
       </p:ext>
     </p:extLst>
   </p:cSld>

</xml_diff>